<commit_message>
Some final changes required
</commit_message>
<xml_diff>
--- a/documentation/Coursework.pptx
+++ b/documentation/Coursework.pptx
@@ -9,6 +9,7 @@
     <p:sldId id="257" r:id="rId3"/>
     <p:sldId id="258" r:id="rId4"/>
     <p:sldId id="260" r:id="rId5"/>
+    <p:sldId id="261" r:id="rId6"/>
   </p:sldIdLst>
   <p:sldSz cx="12192000" cy="6858000"/>
   <p:notesSz cx="6858000" cy="9144000"/>
@@ -241,7 +242,8 @@
           <a:p>
             <a:fld id="{57692A5C-8216-4B73-B5F7-C2378B2FC875}" type="datetimeFigureOut">
               <a:rPr lang="en-GB" smtClean="0"/>
-              <a:t>06/03/2018</a:t>
+              <a:pPr/>
+              <a:t>23/04/2018</a:t>
             </a:fld>
             <a:endParaRPr lang="en-GB"/>
           </a:p>
@@ -283,6 +285,7 @@
           <a:p>
             <a:fld id="{D4E3459A-66AA-4CC4-8DB6-26C82BF3DDEA}" type="slidenum">
               <a:rPr lang="en-GB" smtClean="0"/>
+              <a:pPr/>
               <a:t>‹#›</a:t>
             </a:fld>
             <a:endParaRPr lang="en-GB"/>
@@ -292,7 +295,7 @@
     </p:spTree>
     <p:extLst>
       <p:ext uri="{BB962C8B-B14F-4D97-AF65-F5344CB8AC3E}">
-        <p14:creationId xmlns:p14="http://schemas.microsoft.com/office/powerpoint/2010/main" val="3826011311"/>
+        <p14:creationId xmlns:p14="http://schemas.microsoft.com/office/powerpoint/2010/main" xmlns="" val="3826011311"/>
       </p:ext>
     </p:extLst>
   </p:cSld>
@@ -411,7 +414,8 @@
           <a:p>
             <a:fld id="{57692A5C-8216-4B73-B5F7-C2378B2FC875}" type="datetimeFigureOut">
               <a:rPr lang="en-GB" smtClean="0"/>
-              <a:t>06/03/2018</a:t>
+              <a:pPr/>
+              <a:t>23/04/2018</a:t>
             </a:fld>
             <a:endParaRPr lang="en-GB"/>
           </a:p>
@@ -453,6 +457,7 @@
           <a:p>
             <a:fld id="{D4E3459A-66AA-4CC4-8DB6-26C82BF3DDEA}" type="slidenum">
               <a:rPr lang="en-GB" smtClean="0"/>
+              <a:pPr/>
               <a:t>‹#›</a:t>
             </a:fld>
             <a:endParaRPr lang="en-GB"/>
@@ -462,7 +467,7 @@
     </p:spTree>
     <p:extLst>
       <p:ext uri="{BB962C8B-B14F-4D97-AF65-F5344CB8AC3E}">
-        <p14:creationId xmlns:p14="http://schemas.microsoft.com/office/powerpoint/2010/main" val="1669100829"/>
+        <p14:creationId xmlns:p14="http://schemas.microsoft.com/office/powerpoint/2010/main" xmlns="" val="1669100829"/>
       </p:ext>
     </p:extLst>
   </p:cSld>
@@ -591,7 +596,8 @@
           <a:p>
             <a:fld id="{57692A5C-8216-4B73-B5F7-C2378B2FC875}" type="datetimeFigureOut">
               <a:rPr lang="en-GB" smtClean="0"/>
-              <a:t>06/03/2018</a:t>
+              <a:pPr/>
+              <a:t>23/04/2018</a:t>
             </a:fld>
             <a:endParaRPr lang="en-GB"/>
           </a:p>
@@ -633,6 +639,7 @@
           <a:p>
             <a:fld id="{D4E3459A-66AA-4CC4-8DB6-26C82BF3DDEA}" type="slidenum">
               <a:rPr lang="en-GB" smtClean="0"/>
+              <a:pPr/>
               <a:t>‹#›</a:t>
             </a:fld>
             <a:endParaRPr lang="en-GB"/>
@@ -642,7 +649,7 @@
     </p:spTree>
     <p:extLst>
       <p:ext uri="{BB962C8B-B14F-4D97-AF65-F5344CB8AC3E}">
-        <p14:creationId xmlns:p14="http://schemas.microsoft.com/office/powerpoint/2010/main" val="959357614"/>
+        <p14:creationId xmlns:p14="http://schemas.microsoft.com/office/powerpoint/2010/main" xmlns="" val="959357614"/>
       </p:ext>
     </p:extLst>
   </p:cSld>
@@ -761,7 +768,8 @@
           <a:p>
             <a:fld id="{57692A5C-8216-4B73-B5F7-C2378B2FC875}" type="datetimeFigureOut">
               <a:rPr lang="en-GB" smtClean="0"/>
-              <a:t>06/03/2018</a:t>
+              <a:pPr/>
+              <a:t>23/04/2018</a:t>
             </a:fld>
             <a:endParaRPr lang="en-GB"/>
           </a:p>
@@ -803,6 +811,7 @@
           <a:p>
             <a:fld id="{D4E3459A-66AA-4CC4-8DB6-26C82BF3DDEA}" type="slidenum">
               <a:rPr lang="en-GB" smtClean="0"/>
+              <a:pPr/>
               <a:t>‹#›</a:t>
             </a:fld>
             <a:endParaRPr lang="en-GB"/>
@@ -812,7 +821,7 @@
     </p:spTree>
     <p:extLst>
       <p:ext uri="{BB962C8B-B14F-4D97-AF65-F5344CB8AC3E}">
-        <p14:creationId xmlns:p14="http://schemas.microsoft.com/office/powerpoint/2010/main" val="3643450995"/>
+        <p14:creationId xmlns:p14="http://schemas.microsoft.com/office/powerpoint/2010/main" xmlns="" val="3643450995"/>
       </p:ext>
     </p:extLst>
   </p:cSld>
@@ -1007,7 +1016,8 @@
           <a:p>
             <a:fld id="{57692A5C-8216-4B73-B5F7-C2378B2FC875}" type="datetimeFigureOut">
               <a:rPr lang="en-GB" smtClean="0"/>
-              <a:t>06/03/2018</a:t>
+              <a:pPr/>
+              <a:t>23/04/2018</a:t>
             </a:fld>
             <a:endParaRPr lang="en-GB"/>
           </a:p>
@@ -1049,6 +1059,7 @@
           <a:p>
             <a:fld id="{D4E3459A-66AA-4CC4-8DB6-26C82BF3DDEA}" type="slidenum">
               <a:rPr lang="en-GB" smtClean="0"/>
+              <a:pPr/>
               <a:t>‹#›</a:t>
             </a:fld>
             <a:endParaRPr lang="en-GB"/>
@@ -1058,7 +1069,7 @@
     </p:spTree>
     <p:extLst>
       <p:ext uri="{BB962C8B-B14F-4D97-AF65-F5344CB8AC3E}">
-        <p14:creationId xmlns:p14="http://schemas.microsoft.com/office/powerpoint/2010/main" val="334125753"/>
+        <p14:creationId xmlns:p14="http://schemas.microsoft.com/office/powerpoint/2010/main" xmlns="" val="334125753"/>
       </p:ext>
     </p:extLst>
   </p:cSld>
@@ -1239,7 +1250,8 @@
           <a:p>
             <a:fld id="{57692A5C-8216-4B73-B5F7-C2378B2FC875}" type="datetimeFigureOut">
               <a:rPr lang="en-GB" smtClean="0"/>
-              <a:t>06/03/2018</a:t>
+              <a:pPr/>
+              <a:t>23/04/2018</a:t>
             </a:fld>
             <a:endParaRPr lang="en-GB"/>
           </a:p>
@@ -1281,6 +1293,7 @@
           <a:p>
             <a:fld id="{D4E3459A-66AA-4CC4-8DB6-26C82BF3DDEA}" type="slidenum">
               <a:rPr lang="en-GB" smtClean="0"/>
+              <a:pPr/>
               <a:t>‹#›</a:t>
             </a:fld>
             <a:endParaRPr lang="en-GB"/>
@@ -1290,7 +1303,7 @@
     </p:spTree>
     <p:extLst>
       <p:ext uri="{BB962C8B-B14F-4D97-AF65-F5344CB8AC3E}">
-        <p14:creationId xmlns:p14="http://schemas.microsoft.com/office/powerpoint/2010/main" val="2396892752"/>
+        <p14:creationId xmlns:p14="http://schemas.microsoft.com/office/powerpoint/2010/main" xmlns="" val="2396892752"/>
       </p:ext>
     </p:extLst>
   </p:cSld>
@@ -1606,7 +1619,8 @@
           <a:p>
             <a:fld id="{57692A5C-8216-4B73-B5F7-C2378B2FC875}" type="datetimeFigureOut">
               <a:rPr lang="en-GB" smtClean="0"/>
-              <a:t>06/03/2018</a:t>
+              <a:pPr/>
+              <a:t>23/04/2018</a:t>
             </a:fld>
             <a:endParaRPr lang="en-GB"/>
           </a:p>
@@ -1648,6 +1662,7 @@
           <a:p>
             <a:fld id="{D4E3459A-66AA-4CC4-8DB6-26C82BF3DDEA}" type="slidenum">
               <a:rPr lang="en-GB" smtClean="0"/>
+              <a:pPr/>
               <a:t>‹#›</a:t>
             </a:fld>
             <a:endParaRPr lang="en-GB"/>
@@ -1657,7 +1672,7 @@
     </p:spTree>
     <p:extLst>
       <p:ext uri="{BB962C8B-B14F-4D97-AF65-F5344CB8AC3E}">
-        <p14:creationId xmlns:p14="http://schemas.microsoft.com/office/powerpoint/2010/main" val="1405112971"/>
+        <p14:creationId xmlns:p14="http://schemas.microsoft.com/office/powerpoint/2010/main" xmlns="" val="1405112971"/>
       </p:ext>
     </p:extLst>
   </p:cSld>
@@ -1724,7 +1739,8 @@
           <a:p>
             <a:fld id="{57692A5C-8216-4B73-B5F7-C2378B2FC875}" type="datetimeFigureOut">
               <a:rPr lang="en-GB" smtClean="0"/>
-              <a:t>06/03/2018</a:t>
+              <a:pPr/>
+              <a:t>23/04/2018</a:t>
             </a:fld>
             <a:endParaRPr lang="en-GB"/>
           </a:p>
@@ -1766,6 +1782,7 @@
           <a:p>
             <a:fld id="{D4E3459A-66AA-4CC4-8DB6-26C82BF3DDEA}" type="slidenum">
               <a:rPr lang="en-GB" smtClean="0"/>
+              <a:pPr/>
               <a:t>‹#›</a:t>
             </a:fld>
             <a:endParaRPr lang="en-GB"/>
@@ -1775,7 +1792,7 @@
     </p:spTree>
     <p:extLst>
       <p:ext uri="{BB962C8B-B14F-4D97-AF65-F5344CB8AC3E}">
-        <p14:creationId xmlns:p14="http://schemas.microsoft.com/office/powerpoint/2010/main" val="181857325"/>
+        <p14:creationId xmlns:p14="http://schemas.microsoft.com/office/powerpoint/2010/main" xmlns="" val="181857325"/>
       </p:ext>
     </p:extLst>
   </p:cSld>
@@ -1819,7 +1836,8 @@
           <a:p>
             <a:fld id="{57692A5C-8216-4B73-B5F7-C2378B2FC875}" type="datetimeFigureOut">
               <a:rPr lang="en-GB" smtClean="0"/>
-              <a:t>06/03/2018</a:t>
+              <a:pPr/>
+              <a:t>23/04/2018</a:t>
             </a:fld>
             <a:endParaRPr lang="en-GB"/>
           </a:p>
@@ -1861,6 +1879,7 @@
           <a:p>
             <a:fld id="{D4E3459A-66AA-4CC4-8DB6-26C82BF3DDEA}" type="slidenum">
               <a:rPr lang="en-GB" smtClean="0"/>
+              <a:pPr/>
               <a:t>‹#›</a:t>
             </a:fld>
             <a:endParaRPr lang="en-GB"/>
@@ -1870,7 +1889,7 @@
     </p:spTree>
     <p:extLst>
       <p:ext uri="{BB962C8B-B14F-4D97-AF65-F5344CB8AC3E}">
-        <p14:creationId xmlns:p14="http://schemas.microsoft.com/office/powerpoint/2010/main" val="823188959"/>
+        <p14:creationId xmlns:p14="http://schemas.microsoft.com/office/powerpoint/2010/main" xmlns="" val="823188959"/>
       </p:ext>
     </p:extLst>
   </p:cSld>
@@ -2096,7 +2115,8 @@
           <a:p>
             <a:fld id="{57692A5C-8216-4B73-B5F7-C2378B2FC875}" type="datetimeFigureOut">
               <a:rPr lang="en-GB" smtClean="0"/>
-              <a:t>06/03/2018</a:t>
+              <a:pPr/>
+              <a:t>23/04/2018</a:t>
             </a:fld>
             <a:endParaRPr lang="en-GB"/>
           </a:p>
@@ -2138,6 +2158,7 @@
           <a:p>
             <a:fld id="{D4E3459A-66AA-4CC4-8DB6-26C82BF3DDEA}" type="slidenum">
               <a:rPr lang="en-GB" smtClean="0"/>
+              <a:pPr/>
               <a:t>‹#›</a:t>
             </a:fld>
             <a:endParaRPr lang="en-GB"/>
@@ -2147,7 +2168,7 @@
     </p:spTree>
     <p:extLst>
       <p:ext uri="{BB962C8B-B14F-4D97-AF65-F5344CB8AC3E}">
-        <p14:creationId xmlns:p14="http://schemas.microsoft.com/office/powerpoint/2010/main" val="1448089032"/>
+        <p14:creationId xmlns:p14="http://schemas.microsoft.com/office/powerpoint/2010/main" xmlns="" val="1448089032"/>
       </p:ext>
     </p:extLst>
   </p:cSld>
@@ -2349,7 +2370,8 @@
           <a:p>
             <a:fld id="{57692A5C-8216-4B73-B5F7-C2378B2FC875}" type="datetimeFigureOut">
               <a:rPr lang="en-GB" smtClean="0"/>
-              <a:t>06/03/2018</a:t>
+              <a:pPr/>
+              <a:t>23/04/2018</a:t>
             </a:fld>
             <a:endParaRPr lang="en-GB"/>
           </a:p>
@@ -2391,6 +2413,7 @@
           <a:p>
             <a:fld id="{D4E3459A-66AA-4CC4-8DB6-26C82BF3DDEA}" type="slidenum">
               <a:rPr lang="en-GB" smtClean="0"/>
+              <a:pPr/>
               <a:t>‹#›</a:t>
             </a:fld>
             <a:endParaRPr lang="en-GB"/>
@@ -2400,7 +2423,7 @@
     </p:spTree>
     <p:extLst>
       <p:ext uri="{BB962C8B-B14F-4D97-AF65-F5344CB8AC3E}">
-        <p14:creationId xmlns:p14="http://schemas.microsoft.com/office/powerpoint/2010/main" val="634461813"/>
+        <p14:creationId xmlns:p14="http://schemas.microsoft.com/office/powerpoint/2010/main" xmlns="" val="634461813"/>
       </p:ext>
     </p:extLst>
   </p:cSld>
@@ -2562,7 +2585,8 @@
           <a:p>
             <a:fld id="{57692A5C-8216-4B73-B5F7-C2378B2FC875}" type="datetimeFigureOut">
               <a:rPr lang="en-GB" smtClean="0"/>
-              <a:t>06/03/2018</a:t>
+              <a:pPr/>
+              <a:t>23/04/2018</a:t>
             </a:fld>
             <a:endParaRPr lang="en-GB"/>
           </a:p>
@@ -2640,6 +2664,7 @@
           <a:p>
             <a:fld id="{D4E3459A-66AA-4CC4-8DB6-26C82BF3DDEA}" type="slidenum">
               <a:rPr lang="en-GB" smtClean="0"/>
+              <a:pPr/>
               <a:t>‹#›</a:t>
             </a:fld>
             <a:endParaRPr lang="en-GB"/>
@@ -2649,7 +2674,7 @@
     </p:spTree>
     <p:extLst>
       <p:ext uri="{BB962C8B-B14F-4D97-AF65-F5344CB8AC3E}">
-        <p14:creationId xmlns:p14="http://schemas.microsoft.com/office/powerpoint/2010/main" val="642050516"/>
+        <p14:creationId xmlns:p14="http://schemas.microsoft.com/office/powerpoint/2010/main" xmlns="" val="642050516"/>
       </p:ext>
     </p:extLst>
   </p:cSld>
@@ -3012,7 +3037,7 @@
     </p:spTree>
     <p:extLst>
       <p:ext uri="{BB962C8B-B14F-4D97-AF65-F5344CB8AC3E}">
-        <p14:creationId xmlns:p14="http://schemas.microsoft.com/office/powerpoint/2010/main" val="2147731020"/>
+        <p14:creationId xmlns:p14="http://schemas.microsoft.com/office/powerpoint/2010/main" xmlns="" val="2147731020"/>
       </p:ext>
     </p:extLst>
   </p:cSld>
@@ -3124,7 +3149,7 @@
     </p:spTree>
     <p:extLst>
       <p:ext uri="{BB962C8B-B14F-4D97-AF65-F5344CB8AC3E}">
-        <p14:creationId xmlns:p14="http://schemas.microsoft.com/office/powerpoint/2010/main" val="3855460877"/>
+        <p14:creationId xmlns:p14="http://schemas.microsoft.com/office/powerpoint/2010/main" xmlns="" val="3855460877"/>
       </p:ext>
     </p:extLst>
   </p:cSld>
@@ -3244,7 +3269,7 @@
     </p:spTree>
     <p:extLst>
       <p:ext uri="{BB962C8B-B14F-4D97-AF65-F5344CB8AC3E}">
-        <p14:creationId xmlns:p14="http://schemas.microsoft.com/office/powerpoint/2010/main" val="3450211054"/>
+        <p14:creationId xmlns:p14="http://schemas.microsoft.com/office/powerpoint/2010/main" xmlns="" val="3450211054"/>
       </p:ext>
     </p:extLst>
   </p:cSld>
@@ -3366,7 +3391,7 @@
           </p:nvPr>
         </p:nvPicPr>
         <p:blipFill>
-          <a:blip r:embed="rId3"/>
+          <a:blip r:embed="rId3" cstate="print"/>
           <a:stretch>
             <a:fillRect/>
           </a:stretch>
@@ -3384,9 +3409,123 @@
     </p:spTree>
     <p:extLst>
       <p:ext uri="{BB962C8B-B14F-4D97-AF65-F5344CB8AC3E}">
-        <p14:creationId xmlns:p14="http://schemas.microsoft.com/office/powerpoint/2010/main" val="3994054123"/>
+        <p14:creationId xmlns:p14="http://schemas.microsoft.com/office/powerpoint/2010/main" xmlns="" val="3994054123"/>
       </p:ext>
     </p:extLst>
+  </p:cSld>
+  <p:clrMapOvr>
+    <a:masterClrMapping/>
+  </p:clrMapOvr>
+</p:sld>
+</file>
+
+<file path=ppt/slides/slide5.xml><?xml version="1.0" encoding="utf-8"?>
+<p:sld xmlns:a="http://schemas.openxmlformats.org/drawingml/2006/main" xmlns:r="http://schemas.openxmlformats.org/officeDocument/2006/relationships" xmlns:p="http://schemas.openxmlformats.org/presentationml/2006/main">
+  <p:cSld>
+    <p:spTree>
+      <p:nvGrpSpPr>
+        <p:cNvPr id="1" name=""/>
+        <p:cNvGrpSpPr/>
+        <p:nvPr/>
+      </p:nvGrpSpPr>
+      <p:grpSpPr>
+        <a:xfrm>
+          <a:off x="0" y="0"/>
+          <a:ext cx="0" cy="0"/>
+          <a:chOff x="0" y="0"/>
+          <a:chExt cx="0" cy="0"/>
+        </a:xfrm>
+      </p:grpSpPr>
+      <p:sp>
+        <p:nvSpPr>
+          <p:cNvPr id="2" name="Title 1"/>
+          <p:cNvSpPr>
+            <a:spLocks noGrp="1"/>
+          </p:cNvSpPr>
+          <p:nvPr>
+            <p:ph type="title"/>
+          </p:nvPr>
+        </p:nvSpPr>
+        <p:spPr/>
+        <p:txBody>
+          <a:bodyPr/>
+          <a:lstStyle/>
+          <a:p>
+            <a:r>
+              <a:rPr lang="en-GB" dirty="0" smtClean="0"/>
+              <a:t>Bugs and </a:t>
+            </a:r>
+            <a:r>
+              <a:rPr lang="en-GB" dirty="0" err="1" smtClean="0"/>
+              <a:t>Todo</a:t>
+            </a:r>
+            <a:endParaRPr lang="en-GB" dirty="0"/>
+          </a:p>
+        </p:txBody>
+      </p:sp>
+      <p:sp>
+        <p:nvSpPr>
+          <p:cNvPr id="3" name="Content Placeholder 2"/>
+          <p:cNvSpPr>
+            <a:spLocks noGrp="1"/>
+          </p:cNvSpPr>
+          <p:nvPr>
+            <p:ph idx="1"/>
+          </p:nvPr>
+        </p:nvSpPr>
+        <p:spPr/>
+        <p:txBody>
+          <a:bodyPr/>
+          <a:lstStyle/>
+          <a:p>
+            <a:r>
+              <a:rPr lang="en-GB" dirty="0" smtClean="0"/>
+              <a:t>Add in Timing information and thread numbers</a:t>
+            </a:r>
+          </a:p>
+          <a:p>
+            <a:r>
+              <a:rPr lang="en-GB" dirty="0" smtClean="0"/>
+              <a:t>Add a class to write this data out</a:t>
+            </a:r>
+          </a:p>
+          <a:p>
+            <a:r>
+              <a:rPr lang="en-GB" dirty="0" smtClean="0"/>
+              <a:t>Bugs</a:t>
+            </a:r>
+          </a:p>
+          <a:p>
+            <a:pPr lvl="1"/>
+            <a:r>
+              <a:rPr lang="en-GB" dirty="0" smtClean="0"/>
+              <a:t>AI firing at empty squares</a:t>
+            </a:r>
+          </a:p>
+          <a:p>
+            <a:pPr lvl="1"/>
+            <a:r>
+              <a:rPr lang="en-GB" dirty="0" err="1" smtClean="0"/>
+              <a:t>Ais</a:t>
+            </a:r>
+            <a:r>
+              <a:rPr lang="en-GB" dirty="0" smtClean="0"/>
+              <a:t> blocked by themselves</a:t>
+            </a:r>
+          </a:p>
+          <a:p>
+            <a:r>
+              <a:rPr lang="en-GB" dirty="0" smtClean="0"/>
+              <a:t>Optimisation </a:t>
+            </a:r>
+            <a:r>
+              <a:rPr lang="en-GB" smtClean="0"/>
+              <a:t>through profiling</a:t>
+            </a:r>
+          </a:p>
+        </p:txBody>
+      </p:sp>
+    </p:spTree>
   </p:cSld>
   <p:clrMapOvr>
     <a:masterClrMapping/>
@@ -3437,7 +3576,7 @@
     </a:clrScheme>
     <a:fontScheme name="Office">
       <a:majorFont>
-        <a:latin typeface="Calibri Light" panose="020F0302020204030204"/>
+        <a:latin typeface="Calibri Light"/>
         <a:ea typeface=""/>
         <a:cs typeface=""/>
         <a:font script="Jpan" typeface="游ゴシック Light"/>
@@ -3472,7 +3611,7 @@
         <a:font script="Geor" typeface="Sylfaen"/>
       </a:majorFont>
       <a:minorFont>
-        <a:latin typeface="Calibri" panose="020F0502020204030204"/>
+        <a:latin typeface="Calibri"/>
         <a:ea typeface=""/>
         <a:cs typeface=""/>
         <a:font script="Jpan" typeface="游ゴシック"/>
@@ -3649,7 +3788,7 @@
   <a:extraClrSchemeLst/>
   <a:extLst>
     <a:ext uri="{05A4C25C-085E-4340-85A3-A5531E510DB2}">
-      <thm15:themeFamily xmlns:thm15="http://schemas.microsoft.com/office/thememl/2012/main" name="Office Theme" id="{62F939B6-93AF-4DB8-9C6B-D6C7DFDC589F}" vid="{4A3C46E8-61CC-4603-A589-7422A47A8E4A}"/>
+      <thm15:themeFamily xmlns:thm15="http://schemas.microsoft.com/office/thememl/2012/main" xmlns="" name="Office Theme" id="{62F939B6-93AF-4DB8-9C6B-D6C7DFDC589F}" vid="{4A3C46E8-61CC-4603-A589-7422A47A8E4A}"/>
     </a:ext>
   </a:extLst>
 </a:theme>

</xml_diff>

<commit_message>
Completed V0.1. Need to refine controls and minimap
</commit_message>
<xml_diff>
--- a/documentation/Coursework.pptx
+++ b/documentation/Coursework.pptx
@@ -10,6 +10,7 @@
     <p:sldId id="258" r:id="rId4"/>
     <p:sldId id="260" r:id="rId5"/>
     <p:sldId id="261" r:id="rId6"/>
+    <p:sldId id="262" r:id="rId7"/>
   </p:sldIdLst>
   <p:sldSz cx="12192000" cy="6858000"/>
   <p:notesSz cx="6858000" cy="9144000"/>
@@ -3516,12 +3517,85 @@
           <a:p>
             <a:r>
               <a:rPr lang="en-GB" dirty="0" smtClean="0"/>
-              <a:t>Optimisation </a:t>
+              <a:t>Optimisation through profiling</a:t>
+            </a:r>
+          </a:p>
+        </p:txBody>
+      </p:sp>
+    </p:spTree>
+  </p:cSld>
+  <p:clrMapOvr>
+    <a:masterClrMapping/>
+  </p:clrMapOvr>
+</p:sld>
+</file>
+
+<file path=ppt/slides/slide6.xml><?xml version="1.0" encoding="utf-8"?>
+<p:sld xmlns:a="http://schemas.openxmlformats.org/drawingml/2006/main" xmlns:r="http://schemas.openxmlformats.org/officeDocument/2006/relationships" xmlns:p="http://schemas.openxmlformats.org/presentationml/2006/main">
+  <p:cSld>
+    <p:spTree>
+      <p:nvGrpSpPr>
+        <p:cNvPr id="1" name=""/>
+        <p:cNvGrpSpPr/>
+        <p:nvPr/>
+      </p:nvGrpSpPr>
+      <p:grpSpPr>
+        <a:xfrm>
+          <a:off x="0" y="0"/>
+          <a:ext cx="0" cy="0"/>
+          <a:chOff x="0" y="0"/>
+          <a:chExt cx="0" cy="0"/>
+        </a:xfrm>
+      </p:grpSpPr>
+      <p:sp>
+        <p:nvSpPr>
+          <p:cNvPr id="2" name="Title 1"/>
+          <p:cNvSpPr>
+            <a:spLocks noGrp="1"/>
+          </p:cNvSpPr>
+          <p:nvPr>
+            <p:ph type="title"/>
+          </p:nvPr>
+        </p:nvSpPr>
+        <p:spPr/>
+        <p:txBody>
+          <a:bodyPr/>
+          <a:lstStyle/>
+          <a:p>
+            <a:endParaRPr lang="en-GB"/>
+          </a:p>
+        </p:txBody>
+      </p:sp>
+      <p:sp>
+        <p:nvSpPr>
+          <p:cNvPr id="3" name="Content Placeholder 2"/>
+          <p:cNvSpPr>
+            <a:spLocks noGrp="1"/>
+          </p:cNvSpPr>
+          <p:nvPr>
+            <p:ph idx="1"/>
+          </p:nvPr>
+        </p:nvSpPr>
+        <p:spPr/>
+        <p:txBody>
+          <a:bodyPr/>
+          <a:lstStyle/>
+          <a:p>
+            <a:r>
+              <a:rPr lang="en-GB" dirty="0" smtClean="0"/>
+              <a:t>-		this	0x0bb9aa58 {...}	</a:t>
+            </a:r>
+            <a:r>
+              <a:rPr lang="en-GB" dirty="0" err="1" smtClean="0"/>
+              <a:t>SearchAndDestoy</a:t>
             </a:r>
             <a:r>
               <a:rPr lang="en-GB" smtClean="0"/>
-              <a:t>through profiling</a:t>
-            </a:r>
+              <a:t> *</a:t>
+            </a:r>
+          </a:p>
+          <a:p>
+            <a:endParaRPr lang="en-GB"/>
           </a:p>
         </p:txBody>
       </p:sp>

</xml_diff>

<commit_message>
Data logging added. Might need some tweaking but ready to start system analysis
</commit_message>
<xml_diff>
--- a/documentation/Coursework.pptx
+++ b/documentation/Coursework.pptx
@@ -244,7 +244,7 @@
             <a:fld id="{57692A5C-8216-4B73-B5F7-C2378B2FC875}" type="datetimeFigureOut">
               <a:rPr lang="en-GB" smtClean="0"/>
               <a:pPr/>
-              <a:t>23/04/2018</a:t>
+              <a:t>26/04/2018</a:t>
             </a:fld>
             <a:endParaRPr lang="en-GB"/>
           </a:p>
@@ -296,7 +296,7 @@
     </p:spTree>
     <p:extLst>
       <p:ext uri="{BB962C8B-B14F-4D97-AF65-F5344CB8AC3E}">
-        <p14:creationId xmlns:p14="http://schemas.microsoft.com/office/powerpoint/2010/main" xmlns="" val="3826011311"/>
+        <p14:creationId xmlns="" xmlns:p14="http://schemas.microsoft.com/office/powerpoint/2010/main" val="3826011311"/>
       </p:ext>
     </p:extLst>
   </p:cSld>
@@ -416,7 +416,7 @@
             <a:fld id="{57692A5C-8216-4B73-B5F7-C2378B2FC875}" type="datetimeFigureOut">
               <a:rPr lang="en-GB" smtClean="0"/>
               <a:pPr/>
-              <a:t>23/04/2018</a:t>
+              <a:t>26/04/2018</a:t>
             </a:fld>
             <a:endParaRPr lang="en-GB"/>
           </a:p>
@@ -468,7 +468,7 @@
     </p:spTree>
     <p:extLst>
       <p:ext uri="{BB962C8B-B14F-4D97-AF65-F5344CB8AC3E}">
-        <p14:creationId xmlns:p14="http://schemas.microsoft.com/office/powerpoint/2010/main" xmlns="" val="1669100829"/>
+        <p14:creationId xmlns="" xmlns:p14="http://schemas.microsoft.com/office/powerpoint/2010/main" val="1669100829"/>
       </p:ext>
     </p:extLst>
   </p:cSld>
@@ -598,7 +598,7 @@
             <a:fld id="{57692A5C-8216-4B73-B5F7-C2378B2FC875}" type="datetimeFigureOut">
               <a:rPr lang="en-GB" smtClean="0"/>
               <a:pPr/>
-              <a:t>23/04/2018</a:t>
+              <a:t>26/04/2018</a:t>
             </a:fld>
             <a:endParaRPr lang="en-GB"/>
           </a:p>
@@ -650,7 +650,7 @@
     </p:spTree>
     <p:extLst>
       <p:ext uri="{BB962C8B-B14F-4D97-AF65-F5344CB8AC3E}">
-        <p14:creationId xmlns:p14="http://schemas.microsoft.com/office/powerpoint/2010/main" xmlns="" val="959357614"/>
+        <p14:creationId xmlns="" xmlns:p14="http://schemas.microsoft.com/office/powerpoint/2010/main" val="959357614"/>
       </p:ext>
     </p:extLst>
   </p:cSld>
@@ -770,7 +770,7 @@
             <a:fld id="{57692A5C-8216-4B73-B5F7-C2378B2FC875}" type="datetimeFigureOut">
               <a:rPr lang="en-GB" smtClean="0"/>
               <a:pPr/>
-              <a:t>23/04/2018</a:t>
+              <a:t>26/04/2018</a:t>
             </a:fld>
             <a:endParaRPr lang="en-GB"/>
           </a:p>
@@ -822,7 +822,7 @@
     </p:spTree>
     <p:extLst>
       <p:ext uri="{BB962C8B-B14F-4D97-AF65-F5344CB8AC3E}">
-        <p14:creationId xmlns:p14="http://schemas.microsoft.com/office/powerpoint/2010/main" xmlns="" val="3643450995"/>
+        <p14:creationId xmlns="" xmlns:p14="http://schemas.microsoft.com/office/powerpoint/2010/main" val="3643450995"/>
       </p:ext>
     </p:extLst>
   </p:cSld>
@@ -1018,7 +1018,7 @@
             <a:fld id="{57692A5C-8216-4B73-B5F7-C2378B2FC875}" type="datetimeFigureOut">
               <a:rPr lang="en-GB" smtClean="0"/>
               <a:pPr/>
-              <a:t>23/04/2018</a:t>
+              <a:t>26/04/2018</a:t>
             </a:fld>
             <a:endParaRPr lang="en-GB"/>
           </a:p>
@@ -1070,7 +1070,7 @@
     </p:spTree>
     <p:extLst>
       <p:ext uri="{BB962C8B-B14F-4D97-AF65-F5344CB8AC3E}">
-        <p14:creationId xmlns:p14="http://schemas.microsoft.com/office/powerpoint/2010/main" xmlns="" val="334125753"/>
+        <p14:creationId xmlns="" xmlns:p14="http://schemas.microsoft.com/office/powerpoint/2010/main" val="334125753"/>
       </p:ext>
     </p:extLst>
   </p:cSld>
@@ -1252,7 +1252,7 @@
             <a:fld id="{57692A5C-8216-4B73-B5F7-C2378B2FC875}" type="datetimeFigureOut">
               <a:rPr lang="en-GB" smtClean="0"/>
               <a:pPr/>
-              <a:t>23/04/2018</a:t>
+              <a:t>26/04/2018</a:t>
             </a:fld>
             <a:endParaRPr lang="en-GB"/>
           </a:p>
@@ -1304,7 +1304,7 @@
     </p:spTree>
     <p:extLst>
       <p:ext uri="{BB962C8B-B14F-4D97-AF65-F5344CB8AC3E}">
-        <p14:creationId xmlns:p14="http://schemas.microsoft.com/office/powerpoint/2010/main" xmlns="" val="2396892752"/>
+        <p14:creationId xmlns="" xmlns:p14="http://schemas.microsoft.com/office/powerpoint/2010/main" val="2396892752"/>
       </p:ext>
     </p:extLst>
   </p:cSld>
@@ -1621,7 +1621,7 @@
             <a:fld id="{57692A5C-8216-4B73-B5F7-C2378B2FC875}" type="datetimeFigureOut">
               <a:rPr lang="en-GB" smtClean="0"/>
               <a:pPr/>
-              <a:t>23/04/2018</a:t>
+              <a:t>26/04/2018</a:t>
             </a:fld>
             <a:endParaRPr lang="en-GB"/>
           </a:p>
@@ -1673,7 +1673,7 @@
     </p:spTree>
     <p:extLst>
       <p:ext uri="{BB962C8B-B14F-4D97-AF65-F5344CB8AC3E}">
-        <p14:creationId xmlns:p14="http://schemas.microsoft.com/office/powerpoint/2010/main" xmlns="" val="1405112971"/>
+        <p14:creationId xmlns="" xmlns:p14="http://schemas.microsoft.com/office/powerpoint/2010/main" val="1405112971"/>
       </p:ext>
     </p:extLst>
   </p:cSld>
@@ -1741,7 +1741,7 @@
             <a:fld id="{57692A5C-8216-4B73-B5F7-C2378B2FC875}" type="datetimeFigureOut">
               <a:rPr lang="en-GB" smtClean="0"/>
               <a:pPr/>
-              <a:t>23/04/2018</a:t>
+              <a:t>26/04/2018</a:t>
             </a:fld>
             <a:endParaRPr lang="en-GB"/>
           </a:p>
@@ -1793,7 +1793,7 @@
     </p:spTree>
     <p:extLst>
       <p:ext uri="{BB962C8B-B14F-4D97-AF65-F5344CB8AC3E}">
-        <p14:creationId xmlns:p14="http://schemas.microsoft.com/office/powerpoint/2010/main" xmlns="" val="181857325"/>
+        <p14:creationId xmlns="" xmlns:p14="http://schemas.microsoft.com/office/powerpoint/2010/main" val="181857325"/>
       </p:ext>
     </p:extLst>
   </p:cSld>
@@ -1838,7 +1838,7 @@
             <a:fld id="{57692A5C-8216-4B73-B5F7-C2378B2FC875}" type="datetimeFigureOut">
               <a:rPr lang="en-GB" smtClean="0"/>
               <a:pPr/>
-              <a:t>23/04/2018</a:t>
+              <a:t>26/04/2018</a:t>
             </a:fld>
             <a:endParaRPr lang="en-GB"/>
           </a:p>
@@ -1890,7 +1890,7 @@
     </p:spTree>
     <p:extLst>
       <p:ext uri="{BB962C8B-B14F-4D97-AF65-F5344CB8AC3E}">
-        <p14:creationId xmlns:p14="http://schemas.microsoft.com/office/powerpoint/2010/main" xmlns="" val="823188959"/>
+        <p14:creationId xmlns="" xmlns:p14="http://schemas.microsoft.com/office/powerpoint/2010/main" val="823188959"/>
       </p:ext>
     </p:extLst>
   </p:cSld>
@@ -2117,7 +2117,7 @@
             <a:fld id="{57692A5C-8216-4B73-B5F7-C2378B2FC875}" type="datetimeFigureOut">
               <a:rPr lang="en-GB" smtClean="0"/>
               <a:pPr/>
-              <a:t>23/04/2018</a:t>
+              <a:t>26/04/2018</a:t>
             </a:fld>
             <a:endParaRPr lang="en-GB"/>
           </a:p>
@@ -2169,7 +2169,7 @@
     </p:spTree>
     <p:extLst>
       <p:ext uri="{BB962C8B-B14F-4D97-AF65-F5344CB8AC3E}">
-        <p14:creationId xmlns:p14="http://schemas.microsoft.com/office/powerpoint/2010/main" xmlns="" val="1448089032"/>
+        <p14:creationId xmlns="" xmlns:p14="http://schemas.microsoft.com/office/powerpoint/2010/main" val="1448089032"/>
       </p:ext>
     </p:extLst>
   </p:cSld>
@@ -2372,7 +2372,7 @@
             <a:fld id="{57692A5C-8216-4B73-B5F7-C2378B2FC875}" type="datetimeFigureOut">
               <a:rPr lang="en-GB" smtClean="0"/>
               <a:pPr/>
-              <a:t>23/04/2018</a:t>
+              <a:t>26/04/2018</a:t>
             </a:fld>
             <a:endParaRPr lang="en-GB"/>
           </a:p>
@@ -2424,7 +2424,7 @@
     </p:spTree>
     <p:extLst>
       <p:ext uri="{BB962C8B-B14F-4D97-AF65-F5344CB8AC3E}">
-        <p14:creationId xmlns:p14="http://schemas.microsoft.com/office/powerpoint/2010/main" xmlns="" val="634461813"/>
+        <p14:creationId xmlns="" xmlns:p14="http://schemas.microsoft.com/office/powerpoint/2010/main" val="634461813"/>
       </p:ext>
     </p:extLst>
   </p:cSld>
@@ -2587,7 +2587,7 @@
             <a:fld id="{57692A5C-8216-4B73-B5F7-C2378B2FC875}" type="datetimeFigureOut">
               <a:rPr lang="en-GB" smtClean="0"/>
               <a:pPr/>
-              <a:t>23/04/2018</a:t>
+              <a:t>26/04/2018</a:t>
             </a:fld>
             <a:endParaRPr lang="en-GB"/>
           </a:p>
@@ -2675,7 +2675,7 @@
     </p:spTree>
     <p:extLst>
       <p:ext uri="{BB962C8B-B14F-4D97-AF65-F5344CB8AC3E}">
-        <p14:creationId xmlns:p14="http://schemas.microsoft.com/office/powerpoint/2010/main" xmlns="" val="642050516"/>
+        <p14:creationId xmlns="" xmlns:p14="http://schemas.microsoft.com/office/powerpoint/2010/main" val="642050516"/>
       </p:ext>
     </p:extLst>
   </p:cSld>
@@ -3038,7 +3038,7 @@
     </p:spTree>
     <p:extLst>
       <p:ext uri="{BB962C8B-B14F-4D97-AF65-F5344CB8AC3E}">
-        <p14:creationId xmlns:p14="http://schemas.microsoft.com/office/powerpoint/2010/main" xmlns="" val="2147731020"/>
+        <p14:creationId xmlns="" xmlns:p14="http://schemas.microsoft.com/office/powerpoint/2010/main" val="2147731020"/>
       </p:ext>
     </p:extLst>
   </p:cSld>
@@ -3150,7 +3150,7 @@
     </p:spTree>
     <p:extLst>
       <p:ext uri="{BB962C8B-B14F-4D97-AF65-F5344CB8AC3E}">
-        <p14:creationId xmlns:p14="http://schemas.microsoft.com/office/powerpoint/2010/main" xmlns="" val="3855460877"/>
+        <p14:creationId xmlns="" xmlns:p14="http://schemas.microsoft.com/office/powerpoint/2010/main" val="3855460877"/>
       </p:ext>
     </p:extLst>
   </p:cSld>
@@ -3270,7 +3270,7 @@
     </p:spTree>
     <p:extLst>
       <p:ext uri="{BB962C8B-B14F-4D97-AF65-F5344CB8AC3E}">
-        <p14:creationId xmlns:p14="http://schemas.microsoft.com/office/powerpoint/2010/main" xmlns="" val="3450211054"/>
+        <p14:creationId xmlns="" xmlns:p14="http://schemas.microsoft.com/office/powerpoint/2010/main" val="3450211054"/>
       </p:ext>
     </p:extLst>
   </p:cSld>
@@ -3399,7 +3399,7 @@
         </p:blipFill>
         <p:spPr>
           <a:xfrm>
-            <a:off x="6172200" y="2061658"/>
+            <a:off x="6172200" y="2087537"/>
             <a:ext cx="5181600" cy="3879272"/>
           </a:xfrm>
           <a:prstGeom prst="rect">
@@ -3410,7 +3410,7 @@
     </p:spTree>
     <p:extLst>
       <p:ext uri="{BB962C8B-B14F-4D97-AF65-F5344CB8AC3E}">
-        <p14:creationId xmlns:p14="http://schemas.microsoft.com/office/powerpoint/2010/main" xmlns="" val="3994054123"/>
+        <p14:creationId xmlns="" xmlns:p14="http://schemas.microsoft.com/office/powerpoint/2010/main" val="3994054123"/>
       </p:ext>
     </p:extLst>
   </p:cSld>
@@ -3862,7 +3862,7 @@
   <a:extraClrSchemeLst/>
   <a:extLst>
     <a:ext uri="{05A4C25C-085E-4340-85A3-A5531E510DB2}">
-      <thm15:themeFamily xmlns:thm15="http://schemas.microsoft.com/office/thememl/2012/main" xmlns="" name="Office Theme" id="{62F939B6-93AF-4DB8-9C6B-D6C7DFDC589F}" vid="{4A3C46E8-61CC-4603-A589-7422A47A8E4A}"/>
+      <thm15:themeFamily xmlns="" xmlns:thm15="http://schemas.microsoft.com/office/thememl/2012/main" name="Office Theme" id="{62F939B6-93AF-4DB8-9C6B-D6C7DFDC589F}" vid="{4A3C46E8-61CC-4603-A589-7422A47A8E4A}"/>
     </a:ext>
   </a:extLst>
 </a:theme>

</xml_diff>